<commit_message>
2D Arrays Lecture updated
</commit_message>
<xml_diff>
--- a/slides/On-Campus/15_01_Arrays2D.pptx
+++ b/slides/On-Campus/15_01_Arrays2D.pptx
@@ -147,7 +147,7 @@
   <pc:docChgLst>
     <pc:chgData name="Marcia Moraes" userId="c9c67e8a-58e2-4733-9a1c-5d44fec4775b" providerId="ADAL" clId="{7ECB0383-6193-4E95-A741-7C236CE4A933}"/>
     <pc:docChg chg="undo custSel addSld delSld modSld modMainMaster">
-      <pc:chgData name="Marcia Moraes" userId="c9c67e8a-58e2-4733-9a1c-5d44fec4775b" providerId="ADAL" clId="{7ECB0383-6193-4E95-A741-7C236CE4A933}" dt="2023-11-25T21:17:30.976" v="834" actId="1076"/>
+      <pc:chgData name="Marcia Moraes" userId="c9c67e8a-58e2-4733-9a1c-5d44fec4775b" providerId="ADAL" clId="{7ECB0383-6193-4E95-A741-7C236CE4A933}" dt="2023-11-27T20:07:03.221" v="836" actId="1076"/>
       <pc:docMkLst>
         <pc:docMk/>
       </pc:docMkLst>
@@ -195,13 +195,6 @@
             <ac:spMk id="5" creationId="{F3EBC060-D4FF-C64E-B919-DFF25A0A3178}"/>
           </ac:spMkLst>
         </pc:spChg>
-      </pc:sldChg>
-      <pc:sldChg chg="del">
-        <pc:chgData name="Marcia Moraes" userId="c9c67e8a-58e2-4733-9a1c-5d44fec4775b" providerId="ADAL" clId="{7ECB0383-6193-4E95-A741-7C236CE4A933}" dt="2023-11-25T20:39:34.591" v="1" actId="2696"/>
-        <pc:sldMkLst>
-          <pc:docMk/>
-          <pc:sldMk cId="926474781" sldId="267"/>
-        </pc:sldMkLst>
       </pc:sldChg>
       <pc:sldChg chg="addSp delSp modSp add">
         <pc:chgData name="Marcia Moraes" userId="c9c67e8a-58e2-4733-9a1c-5d44fec4775b" providerId="ADAL" clId="{7ECB0383-6193-4E95-A741-7C236CE4A933}" dt="2023-11-25T21:14:00.515" v="831" actId="20577"/>
@@ -290,7 +283,7 @@
         </pc:picChg>
       </pc:sldChg>
       <pc:sldChg chg="addSp delSp modSp add delAnim modAnim">
-        <pc:chgData name="Marcia Moraes" userId="c9c67e8a-58e2-4733-9a1c-5d44fec4775b" providerId="ADAL" clId="{7ECB0383-6193-4E95-A741-7C236CE4A933}" dt="2023-11-25T21:11:44.893" v="733" actId="1076"/>
+        <pc:chgData name="Marcia Moraes" userId="c9c67e8a-58e2-4733-9a1c-5d44fec4775b" providerId="ADAL" clId="{7ECB0383-6193-4E95-A741-7C236CE4A933}" dt="2023-11-27T20:07:03.221" v="836" actId="1076"/>
         <pc:sldMkLst>
           <pc:docMk/>
           <pc:sldMk cId="2803234373" sldId="274"/>
@@ -304,7 +297,7 @@
           </ac:spMkLst>
         </pc:spChg>
         <pc:spChg chg="mod">
-          <ac:chgData name="Marcia Moraes" userId="c9c67e8a-58e2-4733-9a1c-5d44fec4775b" providerId="ADAL" clId="{7ECB0383-6193-4E95-A741-7C236CE4A933}" dt="2023-11-25T21:10:35.892" v="721" actId="1076"/>
+          <ac:chgData name="Marcia Moraes" userId="c9c67e8a-58e2-4733-9a1c-5d44fec4775b" providerId="ADAL" clId="{7ECB0383-6193-4E95-A741-7C236CE4A933}" dt="2023-11-27T20:04:56.751" v="835" actId="20577"/>
           <ac:spMkLst>
             <pc:docMk/>
             <pc:sldMk cId="2803234373" sldId="274"/>
@@ -344,7 +337,7 @@
           </ac:picMkLst>
         </pc:picChg>
         <pc:picChg chg="add mod modCrop">
-          <ac:chgData name="Marcia Moraes" userId="c9c67e8a-58e2-4733-9a1c-5d44fec4775b" providerId="ADAL" clId="{7ECB0383-6193-4E95-A741-7C236CE4A933}" dt="2023-11-25T21:10:38.449" v="722" actId="1076"/>
+          <ac:chgData name="Marcia Moraes" userId="c9c67e8a-58e2-4733-9a1c-5d44fec4775b" providerId="ADAL" clId="{7ECB0383-6193-4E95-A741-7C236CE4A933}" dt="2023-11-27T20:07:03.221" v="836" actId="1076"/>
           <ac:picMkLst>
             <pc:docMk/>
             <pc:sldMk cId="2803234373" sldId="274"/>
@@ -489,7 +482,7 @@
           <a:p>
             <a:fld id="{4D7E51A5-B478-1E40-8CBB-0DAA8831E99D}" type="datetimeFigureOut">
               <a:rPr lang="en-US" smtClean="0"/>
-              <a:t>11/25/2023</a:t>
+              <a:t>11/27/2023</a:t>
             </a:fld>
             <a:endParaRPr lang="en-US"/>
           </a:p>
@@ -654,7 +647,7 @@
           <a:p>
             <a:fld id="{D0ED587F-861E-6740-9643-E3DDAE89B8D6}" type="datetimeFigureOut">
               <a:rPr lang="en-US" smtClean="0"/>
-              <a:t>11/25/2023</a:t>
+              <a:t>11/27/2023</a:t>
             </a:fld>
             <a:endParaRPr lang="en-US"/>
           </a:p>
@@ -22628,7 +22621,7 @@
             </a:solidFill>
             <a:extLst>
               <a:ext uri="{C807C97D-BFC1-408E-A445-0C87EB9F89A2}">
-                <ask:lineSketchStyleProps xmlns="" xmlns:ask="http://schemas.microsoft.com/office/drawing/2018/sketchyshapes" sd="1219033472">
+                <ask:lineSketchStyleProps xmlns:ask="http://schemas.microsoft.com/office/drawing/2018/sketchyshapes" xmlns="" sd="1219033472">
                   <a:prstGeom prst="donut">
                     <a:avLst>
                       <a:gd name="adj" fmla="val 7120"/>
@@ -22921,7 +22914,7 @@
             </a:solidFill>
             <a:extLst>
               <a:ext uri="{C807C97D-BFC1-408E-A445-0C87EB9F89A2}">
-                <ask:lineSketchStyleProps xmlns="" xmlns:ask="http://schemas.microsoft.com/office/drawing/2018/sketchyshapes" sd="1219033472">
+                <ask:lineSketchStyleProps xmlns:ask="http://schemas.microsoft.com/office/drawing/2018/sketchyshapes" xmlns="" sd="1219033472">
                   <a:prstGeom prst="donut">
                     <a:avLst>
                       <a:gd name="adj" fmla="val 7120"/>
@@ -25330,7 +25323,7 @@
         <p:spPr>
           <a:xfrm>
             <a:off x="747819" y="2587062"/>
-            <a:ext cx="6382324" cy="1560748"/>
+            <a:ext cx="6382324" cy="1037528"/>
           </a:xfrm>
         </p:spPr>
         <p:txBody>
@@ -25364,15 +25357,6 @@
             <a:r>
               <a:rPr lang="en-US" sz="2000" dirty="0"/>
               <a:t>(ragged));</a:t>
-            </a:r>
-          </a:p>
-          <a:p>
-            <a:pPr marL="0" indent="0">
-              <a:buNone/>
-            </a:pPr>
-            <a:r>
-              <a:rPr lang="en-US" sz="2000" dirty="0"/>
-              <a:t>print2D(ragged);</a:t>
             </a:r>
           </a:p>
         </p:txBody>
@@ -26352,7 +26336,7 @@
         </p:blipFill>
         <p:spPr>
           <a:xfrm>
-            <a:off x="628075" y="4264285"/>
+            <a:off x="628075" y="3871475"/>
             <a:ext cx="2518629" cy="337457"/>
           </a:xfrm>
           <a:prstGeom prst="rect">
@@ -26750,7 +26734,7 @@
                             </p:stCondLst>
                             <p:childTnLst>
                               <p:par>
-                                <p:cTn id="13" presetID="1" presetClass="entr" presetSubtype="0" fill="hold" grpId="0" nodeType="clickEffect">
+                                <p:cTn id="13" presetID="1" presetClass="entr" presetSubtype="0" fill="hold" nodeType="clickEffect">
                                   <p:stCondLst>
                                     <p:cond delay="0"/>
                                   </p:stCondLst>
@@ -26763,11 +26747,7 @@
                                           </p:stCondLst>
                                         </p:cTn>
                                         <p:tgtEl>
-                                          <p:spTgt spid="3">
-                                            <p:txEl>
-                                              <p:pRg st="2" end="2"/>
-                                            </p:txEl>
-                                          </p:spTgt>
+                                          <p:spTgt spid="7"/>
                                         </p:tgtEl>
                                         <p:attrNameLst>
                                           <p:attrName>style.visibility</p:attrName>
@@ -26799,7 +26779,7 @@
                             </p:stCondLst>
                             <p:childTnLst>
                               <p:par>
-                                <p:cTn id="17" presetID="1" presetClass="entr" presetSubtype="0" fill="hold" nodeType="clickEffect">
+                                <p:cTn id="17" presetID="1" presetClass="entr" presetSubtype="0" fill="hold" grpId="0" nodeType="clickEffect">
                                   <p:stCondLst>
                                     <p:cond delay="0"/>
                                   </p:stCondLst>
@@ -26812,7 +26792,11 @@
                                           </p:stCondLst>
                                         </p:cTn>
                                         <p:tgtEl>
-                                          <p:spTgt spid="7"/>
+                                          <p:spTgt spid="8">
+                                            <p:txEl>
+                                              <p:pRg st="0" end="0"/>
+                                            </p:txEl>
+                                          </p:spTgt>
                                         </p:tgtEl>
                                         <p:attrNameLst>
                                           <p:attrName>style.visibility</p:attrName>
@@ -26859,7 +26843,7 @@
                                         <p:tgtEl>
                                           <p:spTgt spid="8">
                                             <p:txEl>
-                                              <p:pRg st="0" end="0"/>
+                                              <p:pRg st="1" end="1"/>
                                             </p:txEl>
                                           </p:spTgt>
                                         </p:tgtEl>
@@ -26908,7 +26892,7 @@
                                         <p:tgtEl>
                                           <p:spTgt spid="8">
                                             <p:txEl>
-                                              <p:pRg st="1" end="1"/>
+                                              <p:pRg st="2" end="2"/>
                                             </p:txEl>
                                           </p:spTgt>
                                         </p:tgtEl>
@@ -26942,7 +26926,7 @@
                             </p:stCondLst>
                             <p:childTnLst>
                               <p:par>
-                                <p:cTn id="29" presetID="1" presetClass="entr" presetSubtype="0" fill="hold" grpId="0" nodeType="clickEffect">
+                                <p:cTn id="29" presetID="1" presetClass="entr" presetSubtype="0" fill="hold" nodeType="clickEffect">
                                   <p:stCondLst>
                                     <p:cond delay="0"/>
                                   </p:stCondLst>
@@ -26950,55 +26934,6 @@
                                     <p:set>
                                       <p:cBhvr>
                                         <p:cTn id="30" dur="1" fill="hold">
-                                          <p:stCondLst>
-                                            <p:cond delay="0"/>
-                                          </p:stCondLst>
-                                        </p:cTn>
-                                        <p:tgtEl>
-                                          <p:spTgt spid="8">
-                                            <p:txEl>
-                                              <p:pRg st="2" end="2"/>
-                                            </p:txEl>
-                                          </p:spTgt>
-                                        </p:tgtEl>
-                                        <p:attrNameLst>
-                                          <p:attrName>style.visibility</p:attrName>
-                                        </p:attrNameLst>
-                                      </p:cBhvr>
-                                      <p:to>
-                                        <p:strVal val="visible"/>
-                                      </p:to>
-                                    </p:set>
-                                  </p:childTnLst>
-                                </p:cTn>
-                              </p:par>
-                            </p:childTnLst>
-                          </p:cTn>
-                        </p:par>
-                      </p:childTnLst>
-                    </p:cTn>
-                  </p:par>
-                  <p:par>
-                    <p:cTn id="31" fill="hold">
-                      <p:stCondLst>
-                        <p:cond delay="indefinite"/>
-                      </p:stCondLst>
-                      <p:childTnLst>
-                        <p:par>
-                          <p:cTn id="32" fill="hold">
-                            <p:stCondLst>
-                              <p:cond delay="0"/>
-                            </p:stCondLst>
-                            <p:childTnLst>
-                              <p:par>
-                                <p:cTn id="33" presetID="1" presetClass="entr" presetSubtype="0" fill="hold" nodeType="clickEffect">
-                                  <p:stCondLst>
-                                    <p:cond delay="0"/>
-                                  </p:stCondLst>
-                                  <p:childTnLst>
-                                    <p:set>
-                                      <p:cBhvr>
-                                        <p:cTn id="34" dur="1" fill="hold">
                                           <p:stCondLst>
                                             <p:cond delay="0"/>
                                           </p:stCondLst>
@@ -27984,6 +27919,14 @@
 </file>
 
 <file path=customXml/item2.xml><?xml version="1.0" encoding="utf-8"?>
+<p:properties xmlns:p="http://schemas.microsoft.com/office/2006/metadata/properties" xmlns:xsi="http://www.w3.org/2001/XMLSchema-instance" xmlns:pc="http://schemas.microsoft.com/office/infopath/2007/PartnerControls">
+  <documentManagement>
+    <_activity xmlns="92c41bee-f0ee-4aa6-9399-a35fbb883510" xsi:nil="true"/>
+  </documentManagement>
+</p:properties>
+</file>
+
+<file path=customXml/item3.xml><?xml version="1.0" encoding="utf-8"?>
 <ct:contentTypeSchema xmlns:ct="http://schemas.microsoft.com/office/2006/metadata/contentType" xmlns:ma="http://schemas.microsoft.com/office/2006/metadata/properties/metaAttributes" ct:_="" ma:_="" ma:contentTypeName="Document" ma:contentTypeID="0x010100074387D78AC76C4289401EF66FB51FCC" ma:contentTypeVersion="17" ma:contentTypeDescription="Create a new document." ma:contentTypeScope="" ma:versionID="6ea101c6cb57f63b5a85da23ec767954">
   <xsd:schema xmlns:xsd="http://www.w3.org/2001/XMLSchema" xmlns:xs="http://www.w3.org/2001/XMLSchema" xmlns:p="http://schemas.microsoft.com/office/2006/metadata/properties" xmlns:ns3="92c41bee-f0ee-4aa6-9399-a35fbb883510" xmlns:ns4="e06ed288-fd75-4b50-bbed-f5a5df88c31c" targetNamespace="http://schemas.microsoft.com/office/2006/metadata/properties" ma:root="true" ma:fieldsID="48fe6c6ae01a1a7d2de28d29084627ef" ns3:_="" ns4:_="">
     <xsd:import namespace="92c41bee-f0ee-4aa6-9399-a35fbb883510"/>
@@ -28230,14 +28173,6 @@
 </ct:contentTypeSchema>
 </file>
 
-<file path=customXml/item3.xml><?xml version="1.0" encoding="utf-8"?>
-<p:properties xmlns:p="http://schemas.microsoft.com/office/2006/metadata/properties" xmlns:xsi="http://www.w3.org/2001/XMLSchema-instance" xmlns:pc="http://schemas.microsoft.com/office/infopath/2007/PartnerControls">
-  <documentManagement>
-    <_activity xmlns="92c41bee-f0ee-4aa6-9399-a35fbb883510" xsi:nil="true"/>
-  </documentManagement>
-</p:properties>
-</file>
-
 <file path=customXml/itemProps1.xml><?xml version="1.0" encoding="utf-8"?>
 <ds:datastoreItem xmlns:ds="http://schemas.openxmlformats.org/officeDocument/2006/customXml" ds:itemID="{66A77AA3-BE6E-4BEF-990F-38F46E89C654}">
   <ds:schemaRefs>
@@ -28247,6 +28182,23 @@
 </file>
 
 <file path=customXml/itemProps2.xml><?xml version="1.0" encoding="utf-8"?>
+<ds:datastoreItem xmlns:ds="http://schemas.openxmlformats.org/officeDocument/2006/customXml" ds:itemID="{63A69FFF-E673-45EA-A2B2-B0F79DFF6569}">
+  <ds:schemaRefs>
+    <ds:schemaRef ds:uri="92c41bee-f0ee-4aa6-9399-a35fbb883510"/>
+    <ds:schemaRef ds:uri="e06ed288-fd75-4b50-bbed-f5a5df88c31c"/>
+    <ds:schemaRef ds:uri="http://purl.org/dc/elements/1.1/"/>
+    <ds:schemaRef ds:uri="http://schemas.microsoft.com/office/2006/metadata/properties"/>
+    <ds:schemaRef ds:uri="http://schemas.microsoft.com/office/2006/documentManagement/types"/>
+    <ds:schemaRef ds:uri="http://www.w3.org/XML/1998/namespace"/>
+    <ds:schemaRef ds:uri="http://schemas.openxmlformats.org/package/2006/metadata/core-properties"/>
+    <ds:schemaRef ds:uri="http://schemas.microsoft.com/office/infopath/2007/PartnerControls"/>
+    <ds:schemaRef ds:uri="http://purl.org/dc/dcmitype/"/>
+    <ds:schemaRef ds:uri="http://purl.org/dc/terms/"/>
+  </ds:schemaRefs>
+</ds:datastoreItem>
+</file>
+
+<file path=customXml/itemProps3.xml><?xml version="1.0" encoding="utf-8"?>
 <ds:datastoreItem xmlns:ds="http://schemas.openxmlformats.org/officeDocument/2006/customXml" ds:itemID="{6FD2DD7A-16C4-41BF-A185-D2F73FA65757}">
   <ds:schemaRefs>
     <ds:schemaRef ds:uri="http://schemas.microsoft.com/office/2006/metadata/contentType"/>
@@ -28263,21 +28215,4 @@
     <ds:schemaRef ds:uri="http://schemas.microsoft.com/internal/obd"/>
   </ds:schemaRefs>
 </ds:datastoreItem>
-</file>
-
-<file path=customXml/itemProps3.xml><?xml version="1.0" encoding="utf-8"?>
-<ds:datastoreItem xmlns:ds="http://schemas.openxmlformats.org/officeDocument/2006/customXml" ds:itemID="{63A69FFF-E673-45EA-A2B2-B0F79DFF6569}">
-  <ds:schemaRefs>
-    <ds:schemaRef ds:uri="e06ed288-fd75-4b50-bbed-f5a5df88c31c"/>
-    <ds:schemaRef ds:uri="http://schemas.microsoft.com/office/2006/documentManagement/types"/>
-    <ds:schemaRef ds:uri="http://purl.org/dc/dcmitype/"/>
-    <ds:schemaRef ds:uri="http://schemas.microsoft.com/office/infopath/2007/PartnerControls"/>
-    <ds:schemaRef ds:uri="http://purl.org/dc/terms/"/>
-    <ds:schemaRef ds:uri="http://purl.org/dc/elements/1.1/"/>
-    <ds:schemaRef ds:uri="92c41bee-f0ee-4aa6-9399-a35fbb883510"/>
-    <ds:schemaRef ds:uri="http://schemas.openxmlformats.org/package/2006/metadata/core-properties"/>
-    <ds:schemaRef ds:uri="http://schemas.microsoft.com/office/2006/metadata/properties"/>
-    <ds:schemaRef ds:uri="http://www.w3.org/XML/1998/namespace"/>
-  </ds:schemaRefs>
-</ds:datastoreItem>
 </file>
</xml_diff>